<commit_message>
Changed beta diversity output to .tiff (from .jpeg) and changed the combination of ordinations in each beta diversity superfigure (sorry again to anyone replicating this that I made them in PowerPoint)
</commit_message>
<xml_diff>
--- a/Figures/Superfigure 2-Sandbox.pptx
+++ b/Figures/Superfigure 2-Sandbox.pptx
@@ -5,7 +5,8 @@
     <p:sldMasterId id="2147483648" r:id="rId1"/>
   </p:sldMasterIdLst>
   <p:sldIdLst>
-    <p:sldId id="256" r:id="rId2"/>
+    <p:sldId id="257" r:id="rId2"/>
+    <p:sldId id="256" r:id="rId3"/>
   </p:sldIdLst>
   <p:sldSz cx="12192000" cy="6858000"/>
   <p:notesSz cx="6858000" cy="9144000"/>
@@ -259,7 +260,7 @@
           <a:p>
             <a:fld id="{EC25AF32-07A7-4946-BEDC-C2DDA8F41498}" type="datetimeFigureOut">
               <a:rPr lang="en-US" smtClean="0"/>
-              <a:t>11/11/21</a:t>
+              <a:t>3/6/22</a:t>
             </a:fld>
             <a:endParaRPr lang="en-US"/>
           </a:p>
@@ -457,7 +458,7 @@
           <a:p>
             <a:fld id="{EC25AF32-07A7-4946-BEDC-C2DDA8F41498}" type="datetimeFigureOut">
               <a:rPr lang="en-US" smtClean="0"/>
-              <a:t>11/11/21</a:t>
+              <a:t>3/6/22</a:t>
             </a:fld>
             <a:endParaRPr lang="en-US"/>
           </a:p>
@@ -665,7 +666,7 @@
           <a:p>
             <a:fld id="{EC25AF32-07A7-4946-BEDC-C2DDA8F41498}" type="datetimeFigureOut">
               <a:rPr lang="en-US" smtClean="0"/>
-              <a:t>11/11/21</a:t>
+              <a:t>3/6/22</a:t>
             </a:fld>
             <a:endParaRPr lang="en-US"/>
           </a:p>
@@ -863,7 +864,7 @@
           <a:p>
             <a:fld id="{EC25AF32-07A7-4946-BEDC-C2DDA8F41498}" type="datetimeFigureOut">
               <a:rPr lang="en-US" smtClean="0"/>
-              <a:t>11/11/21</a:t>
+              <a:t>3/6/22</a:t>
             </a:fld>
             <a:endParaRPr lang="en-US"/>
           </a:p>
@@ -1138,7 +1139,7 @@
           <a:p>
             <a:fld id="{EC25AF32-07A7-4946-BEDC-C2DDA8F41498}" type="datetimeFigureOut">
               <a:rPr lang="en-US" smtClean="0"/>
-              <a:t>11/11/21</a:t>
+              <a:t>3/6/22</a:t>
             </a:fld>
             <a:endParaRPr lang="en-US"/>
           </a:p>
@@ -1403,7 +1404,7 @@
           <a:p>
             <a:fld id="{EC25AF32-07A7-4946-BEDC-C2DDA8F41498}" type="datetimeFigureOut">
               <a:rPr lang="en-US" smtClean="0"/>
-              <a:t>11/11/21</a:t>
+              <a:t>3/6/22</a:t>
             </a:fld>
             <a:endParaRPr lang="en-US"/>
           </a:p>
@@ -1815,7 +1816,7 @@
           <a:p>
             <a:fld id="{EC25AF32-07A7-4946-BEDC-C2DDA8F41498}" type="datetimeFigureOut">
               <a:rPr lang="en-US" smtClean="0"/>
-              <a:t>11/11/21</a:t>
+              <a:t>3/6/22</a:t>
             </a:fld>
             <a:endParaRPr lang="en-US"/>
           </a:p>
@@ -1956,7 +1957,7 @@
           <a:p>
             <a:fld id="{EC25AF32-07A7-4946-BEDC-C2DDA8F41498}" type="datetimeFigureOut">
               <a:rPr lang="en-US" smtClean="0"/>
-              <a:t>11/11/21</a:t>
+              <a:t>3/6/22</a:t>
             </a:fld>
             <a:endParaRPr lang="en-US"/>
           </a:p>
@@ -2069,7 +2070,7 @@
           <a:p>
             <a:fld id="{EC25AF32-07A7-4946-BEDC-C2DDA8F41498}" type="datetimeFigureOut">
               <a:rPr lang="en-US" smtClean="0"/>
-              <a:t>11/11/21</a:t>
+              <a:t>3/6/22</a:t>
             </a:fld>
             <a:endParaRPr lang="en-US"/>
           </a:p>
@@ -2380,7 +2381,7 @@
           <a:p>
             <a:fld id="{EC25AF32-07A7-4946-BEDC-C2DDA8F41498}" type="datetimeFigureOut">
               <a:rPr lang="en-US" smtClean="0"/>
-              <a:t>11/11/21</a:t>
+              <a:t>3/6/22</a:t>
             </a:fld>
             <a:endParaRPr lang="en-US"/>
           </a:p>
@@ -2668,7 +2669,7 @@
           <a:p>
             <a:fld id="{EC25AF32-07A7-4946-BEDC-C2DDA8F41498}" type="datetimeFigureOut">
               <a:rPr lang="en-US" smtClean="0"/>
-              <a:t>11/11/21</a:t>
+              <a:t>3/6/22</a:t>
             </a:fld>
             <a:endParaRPr lang="en-US"/>
           </a:p>
@@ -2909,7 +2910,7 @@
           <a:p>
             <a:fld id="{EC25AF32-07A7-4946-BEDC-C2DDA8F41498}" type="datetimeFigureOut">
               <a:rPr lang="en-US" smtClean="0"/>
-              <a:t>11/11/21</a:t>
+              <a:t>3/6/22</a:t>
             </a:fld>
             <a:endParaRPr lang="en-US"/>
           </a:p>
@@ -3328,6 +3329,446 @@
       </p:grpSpPr>
       <p:grpSp>
         <p:nvGrpSpPr>
+          <p:cNvPr id="10" name="Group 9">
+            <a:extLst>
+              <a:ext uri="{FF2B5EF4-FFF2-40B4-BE49-F238E27FC236}">
+                <a16:creationId xmlns:a16="http://schemas.microsoft.com/office/drawing/2014/main" id="{A2125448-F059-2D41-9997-A1A80385AB08}"/>
+              </a:ext>
+            </a:extLst>
+          </p:cNvPr>
+          <p:cNvGrpSpPr/>
+          <p:nvPr/>
+        </p:nvGrpSpPr>
+        <p:grpSpPr>
+          <a:xfrm>
+            <a:off x="2960915" y="468085"/>
+            <a:ext cx="6019800" cy="3048000"/>
+            <a:chOff x="2764972" y="2100942"/>
+            <a:chExt cx="6019800" cy="3048000"/>
+          </a:xfrm>
+        </p:grpSpPr>
+        <p:pic>
+          <p:nvPicPr>
+            <p:cNvPr id="3" name="Picture 2" descr="Chart&#10;&#10;Description automatically generated">
+              <a:extLst>
+                <a:ext uri="{FF2B5EF4-FFF2-40B4-BE49-F238E27FC236}">
+                  <a16:creationId xmlns:a16="http://schemas.microsoft.com/office/drawing/2014/main" id="{2D34599A-E3D7-2B46-981D-DD6EF7401D38}"/>
+                </a:ext>
+              </a:extLst>
+            </p:cNvPr>
+            <p:cNvPicPr>
+              <a:picLocks noChangeAspect="1"/>
+            </p:cNvPicPr>
+            <p:nvPr/>
+          </p:nvPicPr>
+          <p:blipFill>
+            <a:blip r:embed="rId2"/>
+            <a:stretch>
+              <a:fillRect/>
+            </a:stretch>
+          </p:blipFill>
+          <p:spPr>
+            <a:xfrm>
+              <a:off x="2764972" y="2100942"/>
+              <a:ext cx="3048000" cy="3048000"/>
+            </a:xfrm>
+            <a:prstGeom prst="rect">
+              <a:avLst/>
+            </a:prstGeom>
+          </p:spPr>
+        </p:pic>
+        <p:sp>
+          <p:nvSpPr>
+            <p:cNvPr id="6" name="TextBox 5">
+              <a:extLst>
+                <a:ext uri="{FF2B5EF4-FFF2-40B4-BE49-F238E27FC236}">
+                  <a16:creationId xmlns:a16="http://schemas.microsoft.com/office/drawing/2014/main" id="{1D6DE8D0-A00A-A14C-8815-5AAD6197E131}"/>
+                </a:ext>
+              </a:extLst>
+            </p:cNvPr>
+            <p:cNvSpPr txBox="1"/>
+            <p:nvPr/>
+          </p:nvSpPr>
+          <p:spPr>
+            <a:xfrm>
+              <a:off x="3965122" y="2205534"/>
+              <a:ext cx="952505" cy="261610"/>
+            </a:xfrm>
+            <a:prstGeom prst="rect">
+              <a:avLst/>
+            </a:prstGeom>
+            <a:noFill/>
+          </p:spPr>
+          <p:txBody>
+            <a:bodyPr wrap="none" rtlCol="0">
+              <a:spAutoFit/>
+            </a:bodyPr>
+            <a:lstStyle/>
+            <a:p>
+              <a:pPr algn="ctr"/>
+              <a:r>
+                <a:rPr lang="en-US" sz="1100" b="1" dirty="0">
+                  <a:latin typeface="Arial" panose="020B0604020202020204" pitchFamily="34" charset="0"/>
+                  <a:cs typeface="Arial" panose="020B0604020202020204" pitchFamily="34" charset="0"/>
+                </a:rPr>
+                <a:t>Bray-Curtis</a:t>
+              </a:r>
+            </a:p>
+          </p:txBody>
+        </p:sp>
+        <p:pic>
+          <p:nvPicPr>
+            <p:cNvPr id="8" name="Picture 7" descr="Chart&#10;&#10;Description automatically generated with medium confidence">
+              <a:extLst>
+                <a:ext uri="{FF2B5EF4-FFF2-40B4-BE49-F238E27FC236}">
+                  <a16:creationId xmlns:a16="http://schemas.microsoft.com/office/drawing/2014/main" id="{0F41FD9B-B2C2-9E40-B5B8-C46F8B5A7E25}"/>
+                </a:ext>
+              </a:extLst>
+            </p:cNvPr>
+            <p:cNvPicPr>
+              <a:picLocks noChangeAspect="1"/>
+            </p:cNvPicPr>
+            <p:nvPr/>
+          </p:nvPicPr>
+          <p:blipFill>
+            <a:blip r:embed="rId3"/>
+            <a:stretch>
+              <a:fillRect/>
+            </a:stretch>
+          </p:blipFill>
+          <p:spPr>
+            <a:xfrm>
+              <a:off x="5736772" y="2100942"/>
+              <a:ext cx="3048000" cy="3048000"/>
+            </a:xfrm>
+            <a:prstGeom prst="rect">
+              <a:avLst/>
+            </a:prstGeom>
+          </p:spPr>
+        </p:pic>
+        <p:sp>
+          <p:nvSpPr>
+            <p:cNvPr id="9" name="TextBox 8">
+              <a:extLst>
+                <a:ext uri="{FF2B5EF4-FFF2-40B4-BE49-F238E27FC236}">
+                  <a16:creationId xmlns:a16="http://schemas.microsoft.com/office/drawing/2014/main" id="{0C950748-CA3D-AD4D-9AA3-786F403CD76C}"/>
+                </a:ext>
+              </a:extLst>
+            </p:cNvPr>
+            <p:cNvSpPr txBox="1"/>
+            <p:nvPr/>
+          </p:nvSpPr>
+          <p:spPr>
+            <a:xfrm>
+              <a:off x="6627055" y="2212332"/>
+              <a:ext cx="1343638" cy="261610"/>
+            </a:xfrm>
+            <a:prstGeom prst="rect">
+              <a:avLst/>
+            </a:prstGeom>
+            <a:noFill/>
+          </p:spPr>
+          <p:txBody>
+            <a:bodyPr wrap="none" rtlCol="0">
+              <a:spAutoFit/>
+            </a:bodyPr>
+            <a:lstStyle/>
+            <a:p>
+              <a:pPr algn="ctr"/>
+              <a:r>
+                <a:rPr lang="en-US" sz="1100" b="1" dirty="0">
+                  <a:latin typeface="Arial" panose="020B0604020202020204" pitchFamily="34" charset="0"/>
+                  <a:cs typeface="Arial" panose="020B0604020202020204" pitchFamily="34" charset="0"/>
+                </a:rPr>
+                <a:t>Weighted </a:t>
+              </a:r>
+              <a:r>
+                <a:rPr lang="en-US" sz="1100" b="1" dirty="0" err="1">
+                  <a:latin typeface="Arial" panose="020B0604020202020204" pitchFamily="34" charset="0"/>
+                  <a:cs typeface="Arial" panose="020B0604020202020204" pitchFamily="34" charset="0"/>
+                </a:rPr>
+                <a:t>Unifrac</a:t>
+              </a:r>
+              <a:endParaRPr lang="en-US" sz="1100" b="1" dirty="0">
+                <a:latin typeface="Arial" panose="020B0604020202020204" pitchFamily="34" charset="0"/>
+                <a:cs typeface="Arial" panose="020B0604020202020204" pitchFamily="34" charset="0"/>
+              </a:endParaRPr>
+            </a:p>
+          </p:txBody>
+        </p:sp>
+      </p:grpSp>
+      <p:sp>
+        <p:nvSpPr>
+          <p:cNvPr id="11" name="TextBox 10">
+            <a:extLst>
+              <a:ext uri="{FF2B5EF4-FFF2-40B4-BE49-F238E27FC236}">
+                <a16:creationId xmlns:a16="http://schemas.microsoft.com/office/drawing/2014/main" id="{835DF449-E2AF-D64A-9430-B137441FF03E}"/>
+              </a:ext>
+            </a:extLst>
+          </p:cNvPr>
+          <p:cNvSpPr txBox="1"/>
+          <p:nvPr/>
+        </p:nvSpPr>
+        <p:spPr>
+          <a:xfrm>
+            <a:off x="914400" y="1817914"/>
+            <a:ext cx="841064" cy="369332"/>
+          </a:xfrm>
+          <a:prstGeom prst="rect">
+            <a:avLst/>
+          </a:prstGeom>
+          <a:noFill/>
+        </p:spPr>
+        <p:txBody>
+          <a:bodyPr wrap="none" rtlCol="0">
+            <a:spAutoFit/>
+          </a:bodyPr>
+          <a:lstStyle/>
+          <a:p>
+            <a:r>
+              <a:rPr lang="en-US" dirty="0"/>
+              <a:t>Beta 1:</a:t>
+            </a:r>
+          </a:p>
+        </p:txBody>
+      </p:sp>
+      <p:sp>
+        <p:nvSpPr>
+          <p:cNvPr id="12" name="TextBox 11">
+            <a:extLst>
+              <a:ext uri="{FF2B5EF4-FFF2-40B4-BE49-F238E27FC236}">
+                <a16:creationId xmlns:a16="http://schemas.microsoft.com/office/drawing/2014/main" id="{49E6DDF1-44AF-B444-9B49-DB428B6D4BFF}"/>
+              </a:ext>
+            </a:extLst>
+          </p:cNvPr>
+          <p:cNvSpPr txBox="1"/>
+          <p:nvPr/>
+        </p:nvSpPr>
+        <p:spPr>
+          <a:xfrm>
+            <a:off x="914400" y="5007429"/>
+            <a:ext cx="841064" cy="369332"/>
+          </a:xfrm>
+          <a:prstGeom prst="rect">
+            <a:avLst/>
+          </a:prstGeom>
+          <a:noFill/>
+        </p:spPr>
+        <p:txBody>
+          <a:bodyPr wrap="none" rtlCol="0">
+            <a:spAutoFit/>
+          </a:bodyPr>
+          <a:lstStyle/>
+          <a:p>
+            <a:r>
+              <a:rPr lang="en-US" dirty="0"/>
+              <a:t>Beta 2:</a:t>
+            </a:r>
+          </a:p>
+        </p:txBody>
+      </p:sp>
+      <p:grpSp>
+        <p:nvGrpSpPr>
+          <p:cNvPr id="19" name="Group 18">
+            <a:extLst>
+              <a:ext uri="{FF2B5EF4-FFF2-40B4-BE49-F238E27FC236}">
+                <a16:creationId xmlns:a16="http://schemas.microsoft.com/office/drawing/2014/main" id="{73933370-7539-EF47-A4EB-0B1511BD4757}"/>
+              </a:ext>
+            </a:extLst>
+          </p:cNvPr>
+          <p:cNvGrpSpPr/>
+          <p:nvPr/>
+        </p:nvGrpSpPr>
+        <p:grpSpPr>
+          <a:xfrm>
+            <a:off x="2960915" y="3620677"/>
+            <a:ext cx="6019800" cy="3054798"/>
+            <a:chOff x="2960915" y="3620677"/>
+            <a:chExt cx="6019800" cy="3054798"/>
+          </a:xfrm>
+        </p:grpSpPr>
+        <p:pic>
+          <p:nvPicPr>
+            <p:cNvPr id="14" name="Picture 13" descr="Chart&#10;&#10;Description automatically generated">
+              <a:extLst>
+                <a:ext uri="{FF2B5EF4-FFF2-40B4-BE49-F238E27FC236}">
+                  <a16:creationId xmlns:a16="http://schemas.microsoft.com/office/drawing/2014/main" id="{B4325403-7253-754F-ADCC-EE8DD78777CC}"/>
+                </a:ext>
+              </a:extLst>
+            </p:cNvPr>
+            <p:cNvPicPr>
+              <a:picLocks noChangeAspect="1"/>
+            </p:cNvPicPr>
+            <p:nvPr/>
+          </p:nvPicPr>
+          <p:blipFill>
+            <a:blip r:embed="rId4"/>
+            <a:stretch>
+              <a:fillRect/>
+            </a:stretch>
+          </p:blipFill>
+          <p:spPr>
+            <a:xfrm>
+              <a:off x="2960915" y="3620677"/>
+              <a:ext cx="3048000" cy="3048000"/>
+            </a:xfrm>
+            <a:prstGeom prst="rect">
+              <a:avLst/>
+            </a:prstGeom>
+          </p:spPr>
+        </p:pic>
+        <p:pic>
+          <p:nvPicPr>
+            <p:cNvPr id="16" name="Picture 15" descr="Chart&#10;&#10;Description automatically generated">
+              <a:extLst>
+                <a:ext uri="{FF2B5EF4-FFF2-40B4-BE49-F238E27FC236}">
+                  <a16:creationId xmlns:a16="http://schemas.microsoft.com/office/drawing/2014/main" id="{7383A55B-505C-9546-BDA1-8DAC5B5B6C3C}"/>
+                </a:ext>
+              </a:extLst>
+            </p:cNvPr>
+            <p:cNvPicPr>
+              <a:picLocks noChangeAspect="1"/>
+            </p:cNvPicPr>
+            <p:nvPr/>
+          </p:nvPicPr>
+          <p:blipFill>
+            <a:blip r:embed="rId5"/>
+            <a:stretch>
+              <a:fillRect/>
+            </a:stretch>
+          </p:blipFill>
+          <p:spPr>
+            <a:xfrm>
+              <a:off x="5932715" y="3627475"/>
+              <a:ext cx="3048000" cy="3048000"/>
+            </a:xfrm>
+            <a:prstGeom prst="rect">
+              <a:avLst/>
+            </a:prstGeom>
+          </p:spPr>
+        </p:pic>
+        <p:sp>
+          <p:nvSpPr>
+            <p:cNvPr id="17" name="TextBox 16">
+              <a:extLst>
+                <a:ext uri="{FF2B5EF4-FFF2-40B4-BE49-F238E27FC236}">
+                  <a16:creationId xmlns:a16="http://schemas.microsoft.com/office/drawing/2014/main" id="{38F807AC-DB7A-954D-96EF-92453B9D3468}"/>
+                </a:ext>
+              </a:extLst>
+            </p:cNvPr>
+            <p:cNvSpPr txBox="1"/>
+            <p:nvPr/>
+          </p:nvSpPr>
+          <p:spPr>
+            <a:xfrm>
+              <a:off x="4278084" y="3736508"/>
+              <a:ext cx="718466" cy="261610"/>
+            </a:xfrm>
+            <a:prstGeom prst="rect">
+              <a:avLst/>
+            </a:prstGeom>
+            <a:noFill/>
+          </p:spPr>
+          <p:txBody>
+            <a:bodyPr wrap="none" rtlCol="0">
+              <a:spAutoFit/>
+            </a:bodyPr>
+            <a:lstStyle/>
+            <a:p>
+              <a:pPr algn="ctr"/>
+              <a:r>
+                <a:rPr lang="en-US" sz="1100" b="1" dirty="0">
+                  <a:latin typeface="Arial" panose="020B0604020202020204" pitchFamily="34" charset="0"/>
+                  <a:cs typeface="Arial" panose="020B0604020202020204" pitchFamily="34" charset="0"/>
+                </a:rPr>
+                <a:t>Jaccard</a:t>
+              </a:r>
+            </a:p>
+          </p:txBody>
+        </p:sp>
+        <p:sp>
+          <p:nvSpPr>
+            <p:cNvPr id="18" name="TextBox 17">
+              <a:extLst>
+                <a:ext uri="{FF2B5EF4-FFF2-40B4-BE49-F238E27FC236}">
+                  <a16:creationId xmlns:a16="http://schemas.microsoft.com/office/drawing/2014/main" id="{4AE4D6A4-B155-2641-8370-4DD7F86327C7}"/>
+                </a:ext>
+              </a:extLst>
+            </p:cNvPr>
+            <p:cNvSpPr txBox="1"/>
+            <p:nvPr/>
+          </p:nvSpPr>
+          <p:spPr>
+            <a:xfrm>
+              <a:off x="6702342" y="3728330"/>
+              <a:ext cx="1508746" cy="261610"/>
+            </a:xfrm>
+            <a:prstGeom prst="rect">
+              <a:avLst/>
+            </a:prstGeom>
+            <a:noFill/>
+          </p:spPr>
+          <p:txBody>
+            <a:bodyPr wrap="none" rtlCol="0">
+              <a:spAutoFit/>
+            </a:bodyPr>
+            <a:lstStyle/>
+            <a:p>
+              <a:pPr algn="ctr"/>
+              <a:r>
+                <a:rPr lang="en-US" sz="1100" b="1" dirty="0">
+                  <a:latin typeface="Arial" panose="020B0604020202020204" pitchFamily="34" charset="0"/>
+                  <a:cs typeface="Arial" panose="020B0604020202020204" pitchFamily="34" charset="0"/>
+                </a:rPr>
+                <a:t>Unweighted </a:t>
+              </a:r>
+              <a:r>
+                <a:rPr lang="en-US" sz="1100" b="1" dirty="0" err="1">
+                  <a:latin typeface="Arial" panose="020B0604020202020204" pitchFamily="34" charset="0"/>
+                  <a:cs typeface="Arial" panose="020B0604020202020204" pitchFamily="34" charset="0"/>
+                </a:rPr>
+                <a:t>Unifrac</a:t>
+              </a:r>
+              <a:endParaRPr lang="en-US" sz="1100" b="1" dirty="0">
+                <a:latin typeface="Arial" panose="020B0604020202020204" pitchFamily="34" charset="0"/>
+                <a:cs typeface="Arial" panose="020B0604020202020204" pitchFamily="34" charset="0"/>
+              </a:endParaRPr>
+            </a:p>
+          </p:txBody>
+        </p:sp>
+      </p:grpSp>
+    </p:spTree>
+    <p:extLst>
+      <p:ext uri="{BB962C8B-B14F-4D97-AF65-F5344CB8AC3E}">
+        <p14:creationId xmlns:p14="http://schemas.microsoft.com/office/powerpoint/2010/main" val="2191926941"/>
+      </p:ext>
+    </p:extLst>
+  </p:cSld>
+  <p:clrMapOvr>
+    <a:masterClrMapping/>
+  </p:clrMapOvr>
+</p:sld>
+</file>
+
+<file path=ppt/slides/slide2.xml><?xml version="1.0" encoding="utf-8"?>
+<p:sld xmlns:a="http://schemas.openxmlformats.org/drawingml/2006/main" xmlns:r="http://schemas.openxmlformats.org/officeDocument/2006/relationships" xmlns:p="http://schemas.openxmlformats.org/presentationml/2006/main">
+  <p:cSld>
+    <p:spTree>
+      <p:nvGrpSpPr>
+        <p:cNvPr id="1" name=""/>
+        <p:cNvGrpSpPr/>
+        <p:nvPr/>
+      </p:nvGrpSpPr>
+      <p:grpSpPr>
+        <a:xfrm>
+          <a:off x="0" y="0"/>
+          <a:ext cx="0" cy="0"/>
+          <a:chOff x="0" y="0"/>
+          <a:chExt cx="0" cy="0"/>
+        </a:xfrm>
+      </p:grpSpPr>
+      <p:grpSp>
+        <p:nvGrpSpPr>
           <p:cNvPr id="20" name="Group 19">
             <a:extLst>
               <a:ext uri="{FF2B5EF4-FFF2-40B4-BE49-F238E27FC236}">
@@ -3554,6 +3995,41 @@
           </p:txBody>
         </p:sp>
       </p:grpSp>
+      <p:sp>
+        <p:nvSpPr>
+          <p:cNvPr id="2" name="TextBox 1">
+            <a:extLst>
+              <a:ext uri="{FF2B5EF4-FFF2-40B4-BE49-F238E27FC236}">
+                <a16:creationId xmlns:a16="http://schemas.microsoft.com/office/drawing/2014/main" id="{A81FF396-8BBF-7B42-9411-156379D3CC4C}"/>
+              </a:ext>
+            </a:extLst>
+          </p:cNvPr>
+          <p:cNvSpPr txBox="1"/>
+          <p:nvPr/>
+        </p:nvSpPr>
+        <p:spPr>
+          <a:xfrm>
+            <a:off x="2133600" y="762000"/>
+            <a:ext cx="2281715" cy="369332"/>
+          </a:xfrm>
+          <a:prstGeom prst="rect">
+            <a:avLst/>
+          </a:prstGeom>
+          <a:noFill/>
+        </p:spPr>
+        <p:txBody>
+          <a:bodyPr wrap="none" rtlCol="0">
+            <a:spAutoFit/>
+          </a:bodyPr>
+          <a:lstStyle/>
+          <a:p>
+            <a:r>
+              <a:rPr lang="en-US" dirty="0"/>
+              <a:t>DEPRECATED VERSION</a:t>
+            </a:r>
+          </a:p>
+        </p:txBody>
+      </p:sp>
     </p:spTree>
     <p:extLst>
       <p:ext uri="{BB962C8B-B14F-4D97-AF65-F5344CB8AC3E}">

</xml_diff>